<commit_message>
Added a bit of introductory text on the poster
</commit_message>
<xml_diff>
--- a/02460 poster/Insect Classification Using Deep Learning.pptx
+++ b/02460 poster/Insect Classification Using Deep Learning.pptx
@@ -34,7 +34,7 @@
       </p:grpSpPr>
       <p:sp>
         <p:nvSpPr>
-          <p:cNvPr id="39" name="PlaceHolder 1"/>
+          <p:cNvPr id="41" name="PlaceHolder 1"/>
           <p:cNvSpPr>
             <a:spLocks noGrp="1"/>
           </p:cNvSpPr>
@@ -80,7 +80,7 @@
       </p:sp>
       <p:sp>
         <p:nvSpPr>
-          <p:cNvPr id="40" name="PlaceHolder 2"/>
+          <p:cNvPr id="42" name="PlaceHolder 2"/>
           <p:cNvSpPr>
             <a:spLocks noGrp="1"/>
           </p:cNvSpPr>
@@ -120,7 +120,7 @@
       </p:sp>
       <p:sp>
         <p:nvSpPr>
-          <p:cNvPr id="41" name="PlaceHolder 3"/>
+          <p:cNvPr id="43" name="PlaceHolder 3"/>
           <p:cNvSpPr>
             <a:spLocks noGrp="1"/>
           </p:cNvSpPr>
@@ -160,7 +160,7 @@
       </p:sp>
       <p:sp>
         <p:nvSpPr>
-          <p:cNvPr id="42" name="PlaceHolder 4"/>
+          <p:cNvPr id="44" name="PlaceHolder 4"/>
           <p:cNvSpPr>
             <a:spLocks noGrp="1"/>
           </p:cNvSpPr>
@@ -201,7 +201,7 @@
       </p:sp>
       <p:sp>
         <p:nvSpPr>
-          <p:cNvPr id="43" name="PlaceHolder 5"/>
+          <p:cNvPr id="45" name="PlaceHolder 5"/>
           <p:cNvSpPr>
             <a:spLocks noGrp="1"/>
           </p:cNvSpPr>
@@ -241,7 +241,7 @@
       </p:sp>
       <p:sp>
         <p:nvSpPr>
-          <p:cNvPr id="44" name="PlaceHolder 6"/>
+          <p:cNvPr id="46" name="PlaceHolder 6"/>
           <p:cNvSpPr>
             <a:spLocks noGrp="1"/>
           </p:cNvSpPr>
@@ -268,7 +268,7 @@
           </a:bodyPr>
           <a:p>
             <a:pPr algn="r"/>
-            <a:fld id="{771BABCC-7EF8-4F43-9F19-1EA03A7DCD9F}" type="slidenum">
+            <a:fld id="{0F975029-4851-4EF4-9D63-19F5F2BD1E38}" type="slidenum">
               <a:rPr b="0" lang="en-US" sz="1400" spc="-1" strike="noStrike">
                 <a:latin typeface="Times New Roman"/>
               </a:rPr>
@@ -341,7 +341,7 @@
                 <a:tab algn="l" pos="0"/>
               </a:tabLst>
             </a:pPr>
-            <a:fld id="{7590ECE9-13AA-4290-B4E2-CAC8A55CCD8C}" type="slidenum">
+            <a:fld id="{98B7552C-A824-4BFC-83A1-66FB46FE1993}" type="slidenum">
               <a:rPr b="0" lang="en-US" sz="1200" spc="-1" strike="noStrike">
                 <a:solidFill>
                   <a:srgbClr val="000000"/>
@@ -460,7 +460,7 @@
       </p:grpSpPr>
       <p:sp>
         <p:nvSpPr>
-          <p:cNvPr id="24" name="PlaceHolder 1"/>
+          <p:cNvPr id="26" name="PlaceHolder 1"/>
           <p:cNvSpPr>
             <a:spLocks noGrp="1"/>
           </p:cNvSpPr>
@@ -497,7 +497,7 @@
       </p:sp>
       <p:sp>
         <p:nvSpPr>
-          <p:cNvPr id="25" name="PlaceHolder 2"/>
+          <p:cNvPr id="27" name="PlaceHolder 2"/>
           <p:cNvSpPr>
             <a:spLocks noGrp="1"/>
           </p:cNvSpPr>
@@ -534,7 +534,7 @@
       </p:sp>
       <p:sp>
         <p:nvSpPr>
-          <p:cNvPr id="26" name="PlaceHolder 3"/>
+          <p:cNvPr id="28" name="PlaceHolder 3"/>
           <p:cNvSpPr>
             <a:spLocks noGrp="1"/>
           </p:cNvSpPr>
@@ -593,7 +593,7 @@
       </p:grpSpPr>
       <p:sp>
         <p:nvSpPr>
-          <p:cNvPr id="27" name="PlaceHolder 1"/>
+          <p:cNvPr id="29" name="PlaceHolder 1"/>
           <p:cNvSpPr>
             <a:spLocks noGrp="1"/>
           </p:cNvSpPr>
@@ -630,7 +630,7 @@
       </p:sp>
       <p:sp>
         <p:nvSpPr>
-          <p:cNvPr id="28" name="PlaceHolder 2"/>
+          <p:cNvPr id="30" name="PlaceHolder 2"/>
           <p:cNvSpPr>
             <a:spLocks noGrp="1"/>
           </p:cNvSpPr>
@@ -667,7 +667,7 @@
       </p:sp>
       <p:sp>
         <p:nvSpPr>
-          <p:cNvPr id="29" name="PlaceHolder 3"/>
+          <p:cNvPr id="31" name="PlaceHolder 3"/>
           <p:cNvSpPr>
             <a:spLocks noGrp="1"/>
           </p:cNvSpPr>
@@ -704,7 +704,7 @@
       </p:sp>
       <p:sp>
         <p:nvSpPr>
-          <p:cNvPr id="30" name="PlaceHolder 4"/>
+          <p:cNvPr id="32" name="PlaceHolder 4"/>
           <p:cNvSpPr>
             <a:spLocks noGrp="1"/>
           </p:cNvSpPr>
@@ -741,7 +741,7 @@
       </p:sp>
       <p:sp>
         <p:nvSpPr>
-          <p:cNvPr id="31" name="PlaceHolder 5"/>
+          <p:cNvPr id="33" name="PlaceHolder 5"/>
           <p:cNvSpPr>
             <a:spLocks noGrp="1"/>
           </p:cNvSpPr>
@@ -800,7 +800,7 @@
       </p:grpSpPr>
       <p:sp>
         <p:nvSpPr>
-          <p:cNvPr id="32" name="PlaceHolder 1"/>
+          <p:cNvPr id="34" name="PlaceHolder 1"/>
           <p:cNvSpPr>
             <a:spLocks noGrp="1"/>
           </p:cNvSpPr>
@@ -837,7 +837,7 @@
       </p:sp>
       <p:sp>
         <p:nvSpPr>
-          <p:cNvPr id="33" name="PlaceHolder 2"/>
+          <p:cNvPr id="35" name="PlaceHolder 2"/>
           <p:cNvSpPr>
             <a:spLocks noGrp="1"/>
           </p:cNvSpPr>
@@ -874,7 +874,7 @@
       </p:sp>
       <p:sp>
         <p:nvSpPr>
-          <p:cNvPr id="34" name="PlaceHolder 3"/>
+          <p:cNvPr id="36" name="PlaceHolder 3"/>
           <p:cNvSpPr>
             <a:spLocks noGrp="1"/>
           </p:cNvSpPr>
@@ -911,7 +911,7 @@
       </p:sp>
       <p:sp>
         <p:nvSpPr>
-          <p:cNvPr id="35" name="PlaceHolder 4"/>
+          <p:cNvPr id="37" name="PlaceHolder 4"/>
           <p:cNvSpPr>
             <a:spLocks noGrp="1"/>
           </p:cNvSpPr>
@@ -948,7 +948,7 @@
       </p:sp>
       <p:sp>
         <p:nvSpPr>
-          <p:cNvPr id="36" name="PlaceHolder 5"/>
+          <p:cNvPr id="38" name="PlaceHolder 5"/>
           <p:cNvSpPr>
             <a:spLocks noGrp="1"/>
           </p:cNvSpPr>
@@ -985,7 +985,7 @@
       </p:sp>
       <p:sp>
         <p:nvSpPr>
-          <p:cNvPr id="37" name="PlaceHolder 6"/>
+          <p:cNvPr id="39" name="PlaceHolder 6"/>
           <p:cNvSpPr>
             <a:spLocks noGrp="1"/>
           </p:cNvSpPr>
@@ -1022,7 +1022,7 @@
       </p:sp>
       <p:sp>
         <p:nvSpPr>
-          <p:cNvPr id="38" name="PlaceHolder 7"/>
+          <p:cNvPr id="40" name="PlaceHolder 7"/>
           <p:cNvSpPr>
             <a:spLocks noGrp="1"/>
           </p:cNvSpPr>
@@ -1081,7 +1081,7 @@
       </p:grpSpPr>
       <p:sp>
         <p:nvSpPr>
-          <p:cNvPr id="3" name="PlaceHolder 1"/>
+          <p:cNvPr id="5" name="PlaceHolder 1"/>
           <p:cNvSpPr>
             <a:spLocks noGrp="1"/>
           </p:cNvSpPr>
@@ -1118,7 +1118,7 @@
       </p:sp>
       <p:sp>
         <p:nvSpPr>
-          <p:cNvPr id="4" name="PlaceHolder 2"/>
+          <p:cNvPr id="6" name="PlaceHolder 2"/>
           <p:cNvSpPr>
             <a:spLocks noGrp="1"/>
           </p:cNvSpPr>
@@ -1175,7 +1175,7 @@
       </p:grpSpPr>
       <p:sp>
         <p:nvSpPr>
-          <p:cNvPr id="5" name="PlaceHolder 1"/>
+          <p:cNvPr id="7" name="PlaceHolder 1"/>
           <p:cNvSpPr>
             <a:spLocks noGrp="1"/>
           </p:cNvSpPr>
@@ -1212,7 +1212,7 @@
       </p:sp>
       <p:sp>
         <p:nvSpPr>
-          <p:cNvPr id="6" name="PlaceHolder 2"/>
+          <p:cNvPr id="8" name="PlaceHolder 2"/>
           <p:cNvSpPr>
             <a:spLocks noGrp="1"/>
           </p:cNvSpPr>
@@ -1271,7 +1271,7 @@
       </p:grpSpPr>
       <p:sp>
         <p:nvSpPr>
-          <p:cNvPr id="7" name="PlaceHolder 1"/>
+          <p:cNvPr id="9" name="PlaceHolder 1"/>
           <p:cNvSpPr>
             <a:spLocks noGrp="1"/>
           </p:cNvSpPr>
@@ -1308,7 +1308,7 @@
       </p:sp>
       <p:sp>
         <p:nvSpPr>
-          <p:cNvPr id="8" name="PlaceHolder 2"/>
+          <p:cNvPr id="10" name="PlaceHolder 2"/>
           <p:cNvSpPr>
             <a:spLocks noGrp="1"/>
           </p:cNvSpPr>
@@ -1345,7 +1345,7 @@
       </p:sp>
       <p:sp>
         <p:nvSpPr>
-          <p:cNvPr id="9" name="PlaceHolder 3"/>
+          <p:cNvPr id="11" name="PlaceHolder 3"/>
           <p:cNvSpPr>
             <a:spLocks noGrp="1"/>
           </p:cNvSpPr>
@@ -1404,7 +1404,7 @@
       </p:grpSpPr>
       <p:sp>
         <p:nvSpPr>
-          <p:cNvPr id="10" name="PlaceHolder 1"/>
+          <p:cNvPr id="12" name="PlaceHolder 1"/>
           <p:cNvSpPr>
             <a:spLocks noGrp="1"/>
           </p:cNvSpPr>
@@ -1463,7 +1463,7 @@
       </p:grpSpPr>
       <p:sp>
         <p:nvSpPr>
-          <p:cNvPr id="11" name="PlaceHolder 1"/>
+          <p:cNvPr id="13" name="PlaceHolder 1"/>
           <p:cNvSpPr>
             <a:spLocks noGrp="1"/>
           </p:cNvSpPr>
@@ -1520,7 +1520,7 @@
       </p:grpSpPr>
       <p:sp>
         <p:nvSpPr>
-          <p:cNvPr id="12" name="PlaceHolder 1"/>
+          <p:cNvPr id="14" name="PlaceHolder 1"/>
           <p:cNvSpPr>
             <a:spLocks noGrp="1"/>
           </p:cNvSpPr>
@@ -1557,7 +1557,7 @@
       </p:sp>
       <p:sp>
         <p:nvSpPr>
-          <p:cNvPr id="13" name="PlaceHolder 2"/>
+          <p:cNvPr id="15" name="PlaceHolder 2"/>
           <p:cNvSpPr>
             <a:spLocks noGrp="1"/>
           </p:cNvSpPr>
@@ -1594,7 +1594,7 @@
       </p:sp>
       <p:sp>
         <p:nvSpPr>
-          <p:cNvPr id="14" name="PlaceHolder 3"/>
+          <p:cNvPr id="16" name="PlaceHolder 3"/>
           <p:cNvSpPr>
             <a:spLocks noGrp="1"/>
           </p:cNvSpPr>
@@ -1631,7 +1631,7 @@
       </p:sp>
       <p:sp>
         <p:nvSpPr>
-          <p:cNvPr id="15" name="PlaceHolder 4"/>
+          <p:cNvPr id="17" name="PlaceHolder 4"/>
           <p:cNvSpPr>
             <a:spLocks noGrp="1"/>
           </p:cNvSpPr>
@@ -1690,7 +1690,7 @@
       </p:grpSpPr>
       <p:sp>
         <p:nvSpPr>
-          <p:cNvPr id="16" name="PlaceHolder 1"/>
+          <p:cNvPr id="18" name="PlaceHolder 1"/>
           <p:cNvSpPr>
             <a:spLocks noGrp="1"/>
           </p:cNvSpPr>
@@ -1727,7 +1727,7 @@
       </p:sp>
       <p:sp>
         <p:nvSpPr>
-          <p:cNvPr id="17" name="PlaceHolder 2"/>
+          <p:cNvPr id="19" name="PlaceHolder 2"/>
           <p:cNvSpPr>
             <a:spLocks noGrp="1"/>
           </p:cNvSpPr>
@@ -1764,7 +1764,7 @@
       </p:sp>
       <p:sp>
         <p:nvSpPr>
-          <p:cNvPr id="18" name="PlaceHolder 3"/>
+          <p:cNvPr id="20" name="PlaceHolder 3"/>
           <p:cNvSpPr>
             <a:spLocks noGrp="1"/>
           </p:cNvSpPr>
@@ -1801,7 +1801,7 @@
       </p:sp>
       <p:sp>
         <p:nvSpPr>
-          <p:cNvPr id="19" name="PlaceHolder 4"/>
+          <p:cNvPr id="21" name="PlaceHolder 4"/>
           <p:cNvSpPr>
             <a:spLocks noGrp="1"/>
           </p:cNvSpPr>
@@ -1860,7 +1860,7 @@
       </p:grpSpPr>
       <p:sp>
         <p:nvSpPr>
-          <p:cNvPr id="20" name="PlaceHolder 1"/>
+          <p:cNvPr id="22" name="PlaceHolder 1"/>
           <p:cNvSpPr>
             <a:spLocks noGrp="1"/>
           </p:cNvSpPr>
@@ -1897,7 +1897,7 @@
       </p:sp>
       <p:sp>
         <p:nvSpPr>
-          <p:cNvPr id="21" name="PlaceHolder 2"/>
+          <p:cNvPr id="23" name="PlaceHolder 2"/>
           <p:cNvSpPr>
             <a:spLocks noGrp="1"/>
           </p:cNvSpPr>
@@ -1934,7 +1934,7 @@
       </p:sp>
       <p:sp>
         <p:nvSpPr>
-          <p:cNvPr id="22" name="PlaceHolder 3"/>
+          <p:cNvPr id="24" name="PlaceHolder 3"/>
           <p:cNvSpPr>
             <a:spLocks noGrp="1"/>
           </p:cNvSpPr>
@@ -1971,7 +1971,7 @@
       </p:sp>
       <p:sp>
         <p:nvSpPr>
-          <p:cNvPr id="23" name="PlaceHolder 4"/>
+          <p:cNvPr id="25" name="PlaceHolder 4"/>
           <p:cNvSpPr>
             <a:spLocks noGrp="1"/>
           </p:cNvSpPr>
@@ -2139,7 +2139,7 @@
                 <a:tab algn="l" pos="0"/>
               </a:tabLst>
             </a:pPr>
-            <a:fld id="{31D2C4CA-A878-41EE-A7CF-F896E2A95B14}" type="slidenum">
+            <a:fld id="{D939ECFA-4A56-4AAA-B0A4-0F61A558A5ED}" type="slidenum">
               <a:rPr b="0" lang="en-US" sz="6400" spc="-1" strike="noStrike">
                 <a:solidFill>
                   <a:srgbClr val="000000"/>
@@ -2151,6 +2151,277 @@
             </a:fld>
             <a:endParaRPr b="0" lang="en-US" sz="6400" spc="-1" strike="noStrike">
               <a:latin typeface="Times New Roman"/>
+            </a:endParaRPr>
+          </a:p>
+        </p:txBody>
+      </p:sp>
+      <p:sp>
+        <p:nvSpPr>
+          <p:cNvPr id="3" name="PlaceHolder 4"/>
+          <p:cNvSpPr>
+            <a:spLocks noGrp="1"/>
+          </p:cNvSpPr>
+          <p:nvPr>
+            <p:ph type="title"/>
+          </p:nvPr>
+        </p:nvSpPr>
+        <p:spPr>
+          <a:xfrm>
+            <a:off x="2140200" y="1208160"/>
+            <a:ext cx="38527200" cy="5056200"/>
+          </a:xfrm>
+          <a:prstGeom prst="rect">
+            <a:avLst/>
+          </a:prstGeom>
+          <a:noFill/>
+          <a:ln w="0">
+            <a:noFill/>
+          </a:ln>
+        </p:spPr>
+        <p:txBody>
+          <a:bodyPr lIns="0" rIns="0" tIns="0" bIns="0" anchor="ctr">
+            <a:noAutofit/>
+          </a:bodyPr>
+          <a:p>
+            <a:r>
+              <a:rPr b="0" lang="en-US" sz="1400" spc="-1" strike="noStrike">
+                <a:solidFill>
+                  <a:srgbClr val="000000"/>
+                </a:solidFill>
+                <a:latin typeface="Arial"/>
+              </a:rPr>
+              <a:t>Click to edit the title text format</a:t>
+            </a:r>
+            <a:endParaRPr b="0" lang="en-US" sz="1400" spc="-1" strike="noStrike">
+              <a:solidFill>
+                <a:srgbClr val="000000"/>
+              </a:solidFill>
+              <a:latin typeface="Arial"/>
+            </a:endParaRPr>
+          </a:p>
+        </p:txBody>
+      </p:sp>
+      <p:sp>
+        <p:nvSpPr>
+          <p:cNvPr id="4" name="PlaceHolder 5"/>
+          <p:cNvSpPr>
+            <a:spLocks noGrp="1"/>
+          </p:cNvSpPr>
+          <p:nvPr>
+            <p:ph type="body"/>
+          </p:nvPr>
+        </p:nvSpPr>
+        <p:spPr>
+          <a:xfrm>
+            <a:off x="2140200" y="7085160"/>
+            <a:ext cx="38527200" cy="17561880"/>
+          </a:xfrm>
+          <a:prstGeom prst="rect">
+            <a:avLst/>
+          </a:prstGeom>
+          <a:noFill/>
+          <a:ln w="0">
+            <a:noFill/>
+          </a:ln>
+        </p:spPr>
+        <p:txBody>
+          <a:bodyPr lIns="0" rIns="0" tIns="0" bIns="0" anchor="t">
+            <a:normAutofit/>
+          </a:bodyPr>
+          <a:p>
+            <a:pPr marL="432000" indent="-324000">
+              <a:spcBef>
+                <a:spcPts val="1417"/>
+              </a:spcBef>
+              <a:buClr>
+                <a:srgbClr val="000000"/>
+              </a:buClr>
+              <a:buSzPct val="45000"/>
+              <a:buFont typeface="Wingdings" charset="2"/>
+              <a:buChar char=""/>
+            </a:pPr>
+            <a:r>
+              <a:rPr b="0" lang="en-US" sz="1400" spc="-1" strike="noStrike">
+                <a:solidFill>
+                  <a:srgbClr val="000000"/>
+                </a:solidFill>
+                <a:latin typeface="Arial"/>
+              </a:rPr>
+              <a:t>Click to edit the outline text format</a:t>
+            </a:r>
+            <a:endParaRPr b="0" lang="en-US" sz="1400" spc="-1" strike="noStrike">
+              <a:solidFill>
+                <a:srgbClr val="000000"/>
+              </a:solidFill>
+              <a:latin typeface="Arial"/>
+            </a:endParaRPr>
+          </a:p>
+          <a:p>
+            <a:pPr lvl="1" marL="864000" indent="-324000">
+              <a:spcBef>
+                <a:spcPts val="1134"/>
+              </a:spcBef>
+              <a:buClr>
+                <a:srgbClr val="000000"/>
+              </a:buClr>
+              <a:buSzPct val="75000"/>
+              <a:buFont typeface="Symbol" charset="2"/>
+              <a:buChar char=""/>
+            </a:pPr>
+            <a:r>
+              <a:rPr b="0" lang="en-US" sz="1400" spc="-1" strike="noStrike">
+                <a:solidFill>
+                  <a:srgbClr val="000000"/>
+                </a:solidFill>
+                <a:latin typeface="Arial"/>
+              </a:rPr>
+              <a:t>Second Outline Level</a:t>
+            </a:r>
+            <a:endParaRPr b="0" lang="en-US" sz="1400" spc="-1" strike="noStrike">
+              <a:solidFill>
+                <a:srgbClr val="000000"/>
+              </a:solidFill>
+              <a:latin typeface="Arial"/>
+            </a:endParaRPr>
+          </a:p>
+          <a:p>
+            <a:pPr lvl="2" marL="1296000" indent="-288000">
+              <a:spcBef>
+                <a:spcPts val="850"/>
+              </a:spcBef>
+              <a:buClr>
+                <a:srgbClr val="000000"/>
+              </a:buClr>
+              <a:buSzPct val="45000"/>
+              <a:buFont typeface="Wingdings" charset="2"/>
+              <a:buChar char=""/>
+            </a:pPr>
+            <a:r>
+              <a:rPr b="0" lang="en-US" sz="1400" spc="-1" strike="noStrike">
+                <a:solidFill>
+                  <a:srgbClr val="000000"/>
+                </a:solidFill>
+                <a:latin typeface="Arial"/>
+              </a:rPr>
+              <a:t>Third Outline Level</a:t>
+            </a:r>
+            <a:endParaRPr b="0" lang="en-US" sz="1400" spc="-1" strike="noStrike">
+              <a:solidFill>
+                <a:srgbClr val="000000"/>
+              </a:solidFill>
+              <a:latin typeface="Arial"/>
+            </a:endParaRPr>
+          </a:p>
+          <a:p>
+            <a:pPr lvl="3" marL="1728000" indent="-216000">
+              <a:spcBef>
+                <a:spcPts val="567"/>
+              </a:spcBef>
+              <a:buClr>
+                <a:srgbClr val="000000"/>
+              </a:buClr>
+              <a:buSzPct val="75000"/>
+              <a:buFont typeface="Symbol" charset="2"/>
+              <a:buChar char=""/>
+            </a:pPr>
+            <a:r>
+              <a:rPr b="0" lang="en-US" sz="1400" spc="-1" strike="noStrike">
+                <a:solidFill>
+                  <a:srgbClr val="000000"/>
+                </a:solidFill>
+                <a:latin typeface="Arial"/>
+              </a:rPr>
+              <a:t>Fourth Outline Level</a:t>
+            </a:r>
+            <a:endParaRPr b="0" lang="en-US" sz="1400" spc="-1" strike="noStrike">
+              <a:solidFill>
+                <a:srgbClr val="000000"/>
+              </a:solidFill>
+              <a:latin typeface="Arial"/>
+            </a:endParaRPr>
+          </a:p>
+          <a:p>
+            <a:pPr lvl="4" marL="2160000" indent="-216000">
+              <a:spcBef>
+                <a:spcPts val="283"/>
+              </a:spcBef>
+              <a:buClr>
+                <a:srgbClr val="000000"/>
+              </a:buClr>
+              <a:buSzPct val="45000"/>
+              <a:buFont typeface="Wingdings" charset="2"/>
+              <a:buChar char=""/>
+            </a:pPr>
+            <a:r>
+              <a:rPr b="0" lang="en-US" sz="2000" spc="-1" strike="noStrike">
+                <a:solidFill>
+                  <a:srgbClr val="000000"/>
+                </a:solidFill>
+                <a:latin typeface="Arial"/>
+              </a:rPr>
+              <a:t>Fifth Outline Level</a:t>
+            </a:r>
+            <a:endParaRPr b="0" lang="en-US" sz="2000" spc="-1" strike="noStrike">
+              <a:solidFill>
+                <a:srgbClr val="000000"/>
+              </a:solidFill>
+              <a:latin typeface="Arial"/>
+            </a:endParaRPr>
+          </a:p>
+          <a:p>
+            <a:pPr lvl="5" marL="2592000" indent="-216000">
+              <a:spcBef>
+                <a:spcPts val="283"/>
+              </a:spcBef>
+              <a:buClr>
+                <a:srgbClr val="000000"/>
+              </a:buClr>
+              <a:buSzPct val="45000"/>
+              <a:buFont typeface="Wingdings" charset="2"/>
+              <a:buChar char=""/>
+            </a:pPr>
+            <a:r>
+              <a:rPr b="0" lang="en-US" sz="2000" spc="-1" strike="noStrike">
+                <a:solidFill>
+                  <a:srgbClr val="000000"/>
+                </a:solidFill>
+                <a:latin typeface="Arial"/>
+              </a:rPr>
+              <a:t>Sixth Outline Level</a:t>
+            </a:r>
+            <a:endParaRPr b="0" lang="en-US" sz="2000" spc="-1" strike="noStrike">
+              <a:solidFill>
+                <a:srgbClr val="000000"/>
+              </a:solidFill>
+              <a:latin typeface="Arial"/>
+            </a:endParaRPr>
+          </a:p>
+          <a:p>
+            <a:pPr lvl="6" marL="3024000" indent="-216000">
+              <a:spcBef>
+                <a:spcPts val="283"/>
+              </a:spcBef>
+              <a:buClr>
+                <a:srgbClr val="000000"/>
+              </a:buClr>
+              <a:buSzPct val="45000"/>
+              <a:buFont typeface="Wingdings" charset="2"/>
+              <a:buChar char=""/>
+            </a:pPr>
+            <a:r>
+              <a:rPr b="0" lang="en-US" sz="2000" spc="-1" strike="noStrike">
+                <a:solidFill>
+                  <a:srgbClr val="000000"/>
+                </a:solidFill>
+                <a:latin typeface="Arial"/>
+              </a:rPr>
+              <a:t>Seventh Outline Level</a:t>
+            </a:r>
+            <a:endParaRPr b="0" lang="en-US" sz="2000" spc="-1" strike="noStrike">
+              <a:solidFill>
+                <a:srgbClr val="000000"/>
+              </a:solidFill>
+              <a:latin typeface="Arial"/>
             </a:endParaRPr>
           </a:p>
         </p:txBody>
@@ -2201,7 +2472,7 @@
       </p:grpSpPr>
       <p:pic>
         <p:nvPicPr>
-          <p:cNvPr id="45" name="Google Shape;89;p13" descr="chartocharattention.png"/>
+          <p:cNvPr id="47" name="Google Shape;89;p13" descr="chartocharattention.png"/>
           <p:cNvPicPr/>
           <p:nvPr/>
         </p:nvPicPr>
@@ -2224,7 +2495,7 @@
       </p:pic>
       <p:sp>
         <p:nvSpPr>
-          <p:cNvPr id="46" name="Google Shape;90;p13"/>
+          <p:cNvPr id="48" name="Google Shape;90;p13"/>
           <p:cNvSpPr/>
           <p:nvPr/>
         </p:nvSpPr>
@@ -2253,32 +2524,9 @@
           <a:fontRef idx="minor"/>
         </p:style>
       </p:sp>
-      <p:pic>
-        <p:nvPicPr>
-          <p:cNvPr id="47" name="Google Shape;91;p13" descr=""/>
-          <p:cNvPicPr/>
-          <p:nvPr/>
-        </p:nvPicPr>
-        <p:blipFill>
-          <a:blip r:embed="rId2"/>
-          <a:stretch/>
-        </p:blipFill>
-        <p:spPr>
-          <a:xfrm>
-            <a:off x="1400040" y="1204560"/>
-            <a:ext cx="3225960" cy="4672800"/>
-          </a:xfrm>
-          <a:prstGeom prst="rect">
-            <a:avLst/>
-          </a:prstGeom>
-          <a:ln w="0">
-            <a:noFill/>
-          </a:ln>
-        </p:spPr>
-      </p:pic>
-      <p:sp>
-        <p:nvSpPr>
-          <p:cNvPr id="48" name="Google Shape;92;p13"/>
+      <p:sp>
+        <p:nvSpPr>
+          <p:cNvPr id="49" name="Google Shape;92;p13"/>
           <p:cNvSpPr/>
           <p:nvPr/>
         </p:nvSpPr>
@@ -2332,7 +2580,7 @@
       </p:sp>
       <p:graphicFrame>
         <p:nvGraphicFramePr>
-          <p:cNvPr id="49" name="Google Shape;93;p13"/>
+          <p:cNvPr id="50" name="Google Shape;93;p13"/>
           <p:cNvGraphicFramePr/>
           <p:nvPr/>
         </p:nvGraphicFramePr>
@@ -2414,7 +2662,7 @@
       </p:graphicFrame>
       <p:sp>
         <p:nvSpPr>
-          <p:cNvPr id="50" name="Google Shape;94;p13"/>
+          <p:cNvPr id="51" name="Google Shape;94;p13"/>
           <p:cNvSpPr/>
           <p:nvPr/>
         </p:nvSpPr>
@@ -2458,27 +2706,7 @@
                 <a:latin typeface="Arial"/>
                 <a:ea typeface="Arial"/>
               </a:rPr>
-              <a:t>Neural machine translation (NMT) uses deep learning to achieve State-Of-The-Art for translation. </a:t>
-            </a:r>
-            <a:r>
-              <a:rPr b="1" lang="en-US" sz="3000" spc="-1" strike="noStrike">
-                <a:solidFill>
-                  <a:srgbClr val="000000"/>
-                </a:solidFill>
-                <a:latin typeface="Arial"/>
-                <a:ea typeface="Arial"/>
-              </a:rPr>
-              <a:t>However</a:t>
-            </a:r>
-            <a:r>
-              <a:rPr b="0" lang="en-US" sz="3000" spc="-1" strike="noStrike">
-                <a:solidFill>
-                  <a:srgbClr val="000000"/>
-                </a:solidFill>
-                <a:latin typeface="Arial"/>
-                <a:ea typeface="Arial"/>
-              </a:rPr>
-              <a:t>, most published NMT uses word-level encodings</a:t>
+              <a:t>Automated, non-destructive insect counting in fields and on agriculture machines can be used to improve pest control and spare useful insects in crops. The challenge is to identify and classify insects reliably and quickly</a:t>
             </a:r>
             <a:r>
               <a:rPr b="0" lang="en-US" sz="3000" spc="-1" strike="noStrike" baseline="30000">
@@ -2498,7 +2726,7 @@
       </p:sp>
       <p:sp>
         <p:nvSpPr>
-          <p:cNvPr id="51" name="Google Shape;95;p13"/>
+          <p:cNvPr id="52" name="Google Shape;95;p13"/>
           <p:cNvSpPr/>
           <p:nvPr/>
         </p:nvSpPr>
@@ -2553,12 +2781,12 @@
       </p:sp>
       <p:pic>
         <p:nvPicPr>
-          <p:cNvPr id="52" name="Google Shape;96;p13" descr="charvsword.png"/>
+          <p:cNvPr id="53" name="Google Shape;96;p13" descr="charvsword.png"/>
           <p:cNvPicPr/>
           <p:nvPr/>
         </p:nvPicPr>
         <p:blipFill>
-          <a:blip r:embed="rId3"/>
+          <a:blip r:embed="rId2"/>
           <a:stretch/>
         </p:blipFill>
         <p:spPr>
@@ -2576,7 +2804,7 @@
       </p:pic>
       <p:sp>
         <p:nvSpPr>
-          <p:cNvPr id="53" name="Google Shape;97;p13"/>
+          <p:cNvPr id="54" name="Google Shape;97;p13"/>
           <p:cNvSpPr/>
           <p:nvPr/>
         </p:nvSpPr>
@@ -2735,7 +2963,7 @@
       </p:sp>
       <p:sp>
         <p:nvSpPr>
-          <p:cNvPr id="54" name="Google Shape;98;p13"/>
+          <p:cNvPr id="55" name="Google Shape;98;p13"/>
           <p:cNvSpPr/>
           <p:nvPr/>
         </p:nvSpPr>
@@ -2790,7 +3018,30 @@
       </p:sp>
       <p:pic>
         <p:nvPicPr>
-          <p:cNvPr id="55" name="Google Shape;99;p13" descr="char2wordencoder.png"/>
+          <p:cNvPr id="56" name="Google Shape;99;p13" descr="char2wordencoder.png"/>
+          <p:cNvPicPr/>
+          <p:nvPr/>
+        </p:nvPicPr>
+        <p:blipFill>
+          <a:blip r:embed="rId3"/>
+          <a:stretch/>
+        </p:blipFill>
+        <p:spPr>
+          <a:xfrm>
+            <a:off x="12030480" y="13326120"/>
+            <a:ext cx="6648120" cy="3428640"/>
+          </a:xfrm>
+          <a:prstGeom prst="rect">
+            <a:avLst/>
+          </a:prstGeom>
+          <a:ln w="0">
+            <a:noFill/>
+          </a:ln>
+        </p:spPr>
+      </p:pic>
+      <p:pic>
+        <p:nvPicPr>
+          <p:cNvPr id="57" name="Google Shape;100;p13" descr="char2wordtocharattention.png"/>
           <p:cNvPicPr/>
           <p:nvPr/>
         </p:nvPicPr>
@@ -2800,8 +3051,8 @@
         </p:blipFill>
         <p:spPr>
           <a:xfrm>
-            <a:off x="12030480" y="13326120"/>
-            <a:ext cx="6648120" cy="3428640"/>
+            <a:off x="17206560" y="20754000"/>
+            <a:ext cx="10153440" cy="5304960"/>
           </a:xfrm>
           <a:prstGeom prst="rect">
             <a:avLst/>
@@ -2813,7 +3064,7 @@
       </p:pic>
       <p:pic>
         <p:nvPicPr>
-          <p:cNvPr id="56" name="Google Shape;100;p13" descr="char2wordtocharattention.png"/>
+          <p:cNvPr id="58" name="Google Shape;101;p13" descr="chartochar.png"/>
           <p:cNvPicPr/>
           <p:nvPr/>
         </p:nvPicPr>
@@ -2823,8 +3074,8 @@
         </p:blipFill>
         <p:spPr>
           <a:xfrm>
-            <a:off x="17206560" y="20754000"/>
-            <a:ext cx="10153440" cy="5304960"/>
+            <a:off x="12016080" y="8400960"/>
+            <a:ext cx="6676560" cy="2962080"/>
           </a:xfrm>
           <a:prstGeom prst="rect">
             <a:avLst/>
@@ -2836,7 +3087,7 @@
       </p:pic>
       <p:pic>
         <p:nvPicPr>
-          <p:cNvPr id="57" name="Google Shape;101;p13" descr="chartochar.png"/>
+          <p:cNvPr id="59" name="Google Shape;102;p13" descr="dm6.png"/>
           <p:cNvPicPr/>
           <p:nvPr/>
         </p:nvPicPr>
@@ -2846,8 +3097,8 @@
         </p:blipFill>
         <p:spPr>
           <a:xfrm>
-            <a:off x="12016080" y="8400960"/>
-            <a:ext cx="6676560" cy="2962080"/>
+            <a:off x="20929320" y="12105360"/>
+            <a:ext cx="5285880" cy="5229000"/>
           </a:xfrm>
           <a:prstGeom prst="rect">
             <a:avLst/>
@@ -2859,7 +3110,7 @@
       </p:pic>
       <p:pic>
         <p:nvPicPr>
-          <p:cNvPr id="58" name="Google Shape;102;p13" descr="dm6.png"/>
+          <p:cNvPr id="60" name="Google Shape;103;p13" descr="dynamic_batching1.png"/>
           <p:cNvPicPr/>
           <p:nvPr/>
         </p:nvPicPr>
@@ -2869,29 +3120,6 @@
         </p:blipFill>
         <p:spPr>
           <a:xfrm>
-            <a:off x="20929320" y="12105360"/>
-            <a:ext cx="5285880" cy="5229000"/>
-          </a:xfrm>
-          <a:prstGeom prst="rect">
-            <a:avLst/>
-          </a:prstGeom>
-          <a:ln w="0">
-            <a:noFill/>
-          </a:ln>
-        </p:spPr>
-      </p:pic>
-      <p:pic>
-        <p:nvPicPr>
-          <p:cNvPr id="59" name="Google Shape;103;p13" descr="dynamic_batching1.png"/>
-          <p:cNvPicPr/>
-          <p:nvPr/>
-        </p:nvPicPr>
-        <p:blipFill>
-          <a:blip r:embed="rId8"/>
-          <a:stretch/>
-        </p:blipFill>
-        <p:spPr>
-          <a:xfrm>
             <a:off x="21060360" y="9339840"/>
             <a:ext cx="3619080" cy="1800000"/>
           </a:xfrm>
@@ -2905,7 +3133,7 @@
       </p:pic>
       <p:sp>
         <p:nvSpPr>
-          <p:cNvPr id="60" name="Google Shape;104;p13"/>
+          <p:cNvPr id="61" name="Google Shape;104;p13"/>
           <p:cNvSpPr/>
           <p:nvPr/>
         </p:nvSpPr>
@@ -2960,7 +3188,7 @@
       </p:sp>
       <p:sp>
         <p:nvSpPr>
-          <p:cNvPr id="61" name="Google Shape;105;p13"/>
+          <p:cNvPr id="62" name="Google Shape;105;p13"/>
           <p:cNvSpPr/>
           <p:nvPr/>
         </p:nvSpPr>
@@ -3017,7 +3245,7 @@
       </p:sp>
       <p:sp>
         <p:nvSpPr>
-          <p:cNvPr id="62" name="Google Shape;106;p13"/>
+          <p:cNvPr id="63" name="Google Shape;106;p13"/>
           <p:cNvSpPr/>
           <p:nvPr/>
         </p:nvSpPr>
@@ -3046,7 +3274,7 @@
       </p:sp>
       <p:sp>
         <p:nvSpPr>
-          <p:cNvPr id="63" name="Google Shape;107;p13"/>
+          <p:cNvPr id="64" name="Google Shape;107;p13"/>
           <p:cNvSpPr/>
           <p:nvPr/>
         </p:nvSpPr>
@@ -3075,7 +3303,7 @@
       </p:sp>
       <p:sp>
         <p:nvSpPr>
-          <p:cNvPr id="64" name="Google Shape;108;p13"/>
+          <p:cNvPr id="65" name="Google Shape;108;p13"/>
           <p:cNvSpPr/>
           <p:nvPr/>
         </p:nvSpPr>
@@ -3104,7 +3332,7 @@
       </p:sp>
       <p:sp>
         <p:nvSpPr>
-          <p:cNvPr id="65" name="Google Shape;109;p13"/>
+          <p:cNvPr id="66" name="Google Shape;109;p13"/>
           <p:cNvSpPr/>
           <p:nvPr/>
         </p:nvSpPr>
@@ -3147,7 +3375,7 @@
       </p:sp>
       <p:sp>
         <p:nvSpPr>
-          <p:cNvPr id="66" name="Google Shape;110;p13"/>
+          <p:cNvPr id="67" name="Google Shape;110;p13"/>
           <p:cNvSpPr/>
           <p:nvPr/>
         </p:nvSpPr>
@@ -3201,7 +3429,7 @@
       </p:sp>
       <p:sp>
         <p:nvSpPr>
-          <p:cNvPr id="67" name="Google Shape;111;p13"/>
+          <p:cNvPr id="68" name="Google Shape;111;p13"/>
           <p:cNvSpPr/>
           <p:nvPr/>
         </p:nvSpPr>
@@ -3244,7 +3472,7 @@
       </p:sp>
       <p:sp>
         <p:nvSpPr>
-          <p:cNvPr id="68" name="Google Shape;112;p13"/>
+          <p:cNvPr id="69" name="Google Shape;112;p13"/>
           <p:cNvSpPr/>
           <p:nvPr/>
         </p:nvSpPr>
@@ -3287,7 +3515,7 @@
       </p:sp>
       <p:sp>
         <p:nvSpPr>
-          <p:cNvPr id="69" name="Google Shape;113;p13"/>
+          <p:cNvPr id="70" name="Google Shape;113;p13"/>
           <p:cNvSpPr/>
           <p:nvPr/>
         </p:nvSpPr>
@@ -3316,7 +3544,7 @@
       </p:sp>
       <p:sp>
         <p:nvSpPr>
-          <p:cNvPr id="70" name="Google Shape;114;p13"/>
+          <p:cNvPr id="71" name="Google Shape;114;p13"/>
           <p:cNvSpPr/>
           <p:nvPr/>
         </p:nvSpPr>
@@ -3359,7 +3587,7 @@
       </p:sp>
       <p:sp>
         <p:nvSpPr>
-          <p:cNvPr id="71" name="Google Shape;115;p13"/>
+          <p:cNvPr id="72" name="Google Shape;115;p13"/>
           <p:cNvSpPr/>
           <p:nvPr/>
         </p:nvSpPr>
@@ -3413,7 +3641,7 @@
       </p:sp>
       <p:sp>
         <p:nvSpPr>
-          <p:cNvPr id="72" name="Google Shape;116;p13"/>
+          <p:cNvPr id="73" name="Google Shape;116;p13"/>
           <p:cNvSpPr/>
           <p:nvPr/>
         </p:nvSpPr>
@@ -3467,7 +3695,7 @@
       </p:sp>
       <p:sp>
         <p:nvSpPr>
-          <p:cNvPr id="73" name="Google Shape;117;p13"/>
+          <p:cNvPr id="74" name="Google Shape;117;p13"/>
           <p:cNvSpPr/>
           <p:nvPr/>
         </p:nvSpPr>
@@ -3521,7 +3749,7 @@
       </p:sp>
       <p:sp>
         <p:nvSpPr>
-          <p:cNvPr id="74" name="Google Shape;118;p13"/>
+          <p:cNvPr id="75" name="Google Shape;118;p13"/>
           <p:cNvSpPr/>
           <p:nvPr/>
         </p:nvSpPr>
@@ -3596,7 +3824,7 @@
       </p:sp>
       <p:sp>
         <p:nvSpPr>
-          <p:cNvPr id="75" name="Google Shape;119;p13"/>
+          <p:cNvPr id="76" name="Google Shape;119;p13"/>
           <p:cNvSpPr/>
           <p:nvPr/>
         </p:nvSpPr>
@@ -3651,7 +3879,7 @@
       </p:sp>
       <p:sp>
         <p:nvSpPr>
-          <p:cNvPr id="76" name="Google Shape;120;p13"/>
+          <p:cNvPr id="77" name="Google Shape;120;p13"/>
           <p:cNvSpPr/>
           <p:nvPr/>
         </p:nvSpPr>
@@ -3726,7 +3954,30 @@
       </p:sp>
       <p:pic>
         <p:nvPicPr>
-          <p:cNvPr id="77" name="Google Shape;121;p13" descr="luong-hybrid-nmt.png"/>
+          <p:cNvPr id="78" name="Google Shape;121;p13" descr="luong-hybrid-nmt.png"/>
+          <p:cNvPicPr/>
+          <p:nvPr/>
+        </p:nvPicPr>
+        <p:blipFill>
+          <a:blip r:embed="rId8"/>
+          <a:stretch/>
+        </p:blipFill>
+        <p:spPr>
+          <a:xfrm>
+            <a:off x="37058400" y="8628120"/>
+            <a:ext cx="3914280" cy="4514400"/>
+          </a:xfrm>
+          <a:prstGeom prst="rect">
+            <a:avLst/>
+          </a:prstGeom>
+          <a:ln w="0">
+            <a:noFill/>
+          </a:ln>
+        </p:spPr>
+      </p:pic>
+      <p:pic>
+        <p:nvPicPr>
+          <p:cNvPr id="79" name="Google Shape;122;p13" descr="model7-1 (1).png"/>
           <p:cNvPicPr/>
           <p:nvPr/>
         </p:nvPicPr>
@@ -3736,29 +3987,6 @@
         </p:blipFill>
         <p:spPr>
           <a:xfrm>
-            <a:off x="37058400" y="8628120"/>
-            <a:ext cx="3914280" cy="4514400"/>
-          </a:xfrm>
-          <a:prstGeom prst="rect">
-            <a:avLst/>
-          </a:prstGeom>
-          <a:ln w="0">
-            <a:noFill/>
-          </a:ln>
-        </p:spPr>
-      </p:pic>
-      <p:pic>
-        <p:nvPicPr>
-          <p:cNvPr id="78" name="Google Shape;122;p13" descr="model7-1 (1).png"/>
-          <p:cNvPicPr/>
-          <p:nvPr/>
-        </p:nvPicPr>
-        <p:blipFill>
-          <a:blip r:embed="rId10"/>
-          <a:stretch/>
-        </p:blipFill>
-        <p:spPr>
-          <a:xfrm>
             <a:off x="35201160" y="14571000"/>
             <a:ext cx="6562440" cy="3190680"/>
           </a:xfrm>
@@ -3772,7 +4000,7 @@
       </p:pic>
       <p:sp>
         <p:nvSpPr>
-          <p:cNvPr id="79" name="Google Shape;123;p13"/>
+          <p:cNvPr id="80" name="Google Shape;123;p13"/>
           <p:cNvSpPr/>
           <p:nvPr/>
         </p:nvSpPr>
@@ -3826,7 +4054,7 @@
       </p:sp>
       <p:sp>
         <p:nvSpPr>
-          <p:cNvPr id="80" name="Google Shape;124;p13"/>
+          <p:cNvPr id="81" name="Google Shape;124;p13"/>
           <p:cNvSpPr/>
           <p:nvPr/>
         </p:nvSpPr>
@@ -3890,7 +4118,7 @@
       </p:sp>
       <p:graphicFrame>
         <p:nvGraphicFramePr>
-          <p:cNvPr id="81" name="Google Shape;125;p13"/>
+          <p:cNvPr id="82" name="Google Shape;125;p13"/>
           <p:cNvGraphicFramePr/>
           <p:nvPr/>
         </p:nvGraphicFramePr>
@@ -4425,7 +4653,7 @@
       </p:graphicFrame>
       <p:sp>
         <p:nvSpPr>
-          <p:cNvPr id="82" name="Google Shape;126;p13"/>
+          <p:cNvPr id="83" name="Google Shape;126;p13"/>
           <p:cNvSpPr/>
           <p:nvPr/>
         </p:nvSpPr>
@@ -4480,7 +4708,7 @@
       </p:sp>
       <p:sp>
         <p:nvSpPr>
-          <p:cNvPr id="83" name="Google Shape;127;p13"/>
+          <p:cNvPr id="84" name="Google Shape;127;p13"/>
           <p:cNvSpPr/>
           <p:nvPr/>
         </p:nvSpPr>
@@ -4522,7 +4750,7 @@
       </p:sp>
       <p:sp>
         <p:nvSpPr>
-          <p:cNvPr id="84" name="Google Shape;128;p13"/>
+          <p:cNvPr id="85" name="Google Shape;128;p13"/>
           <p:cNvSpPr/>
           <p:nvPr/>
         </p:nvSpPr>
@@ -4564,7 +4792,7 @@
       </p:sp>
       <p:sp>
         <p:nvSpPr>
-          <p:cNvPr id="85" name="Google Shape;129;p13"/>
+          <p:cNvPr id="86" name="Google Shape;129;p13"/>
           <p:cNvSpPr/>
           <p:nvPr/>
         </p:nvSpPr>
@@ -4606,7 +4834,7 @@
       </p:sp>
       <p:sp>
         <p:nvSpPr>
-          <p:cNvPr id="86" name="Google Shape;130;p13"/>
+          <p:cNvPr id="87" name="Google Shape;130;p13"/>
           <p:cNvSpPr/>
           <p:nvPr/>
         </p:nvSpPr>
@@ -4670,7 +4898,7 @@
       </p:sp>
       <p:sp>
         <p:nvSpPr>
-          <p:cNvPr id="87" name="Google Shape;131;p13"/>
+          <p:cNvPr id="88" name="Google Shape;131;p13"/>
           <p:cNvSpPr/>
           <p:nvPr/>
         </p:nvSpPr>
@@ -4734,7 +4962,7 @@
       </p:sp>
       <p:sp>
         <p:nvSpPr>
-          <p:cNvPr id="88" name="Google Shape;132;p13"/>
+          <p:cNvPr id="89" name="Google Shape;132;p13"/>
           <p:cNvSpPr/>
           <p:nvPr/>
         </p:nvSpPr>
@@ -4788,7 +5016,7 @@
       </p:sp>
       <p:sp>
         <p:nvSpPr>
-          <p:cNvPr id="89" name="Google Shape;133;p13"/>
+          <p:cNvPr id="90" name="Google Shape;133;p13"/>
           <p:cNvSpPr/>
           <p:nvPr/>
         </p:nvSpPr>
@@ -4842,7 +5070,30 @@
       </p:sp>
       <p:pic>
         <p:nvPicPr>
-          <p:cNvPr id="90" name="Google Shape;134;p13" descr="encoder_1.png"/>
+          <p:cNvPr id="91" name="Google Shape;134;p13" descr="encoder_1.png"/>
+          <p:cNvPicPr/>
+          <p:nvPr/>
+        </p:nvPicPr>
+        <p:blipFill>
+          <a:blip r:embed="rId10"/>
+          <a:stretch/>
+        </p:blipFill>
+        <p:spPr>
+          <a:xfrm>
+            <a:off x="13182840" y="11442240"/>
+            <a:ext cx="3514320" cy="1228320"/>
+          </a:xfrm>
+          <a:prstGeom prst="rect">
+            <a:avLst/>
+          </a:prstGeom>
+          <a:ln w="0">
+            <a:noFill/>
+          </a:ln>
+        </p:spPr>
+      </p:pic>
+      <p:pic>
+        <p:nvPicPr>
+          <p:cNvPr id="92" name="Google Shape;135;p13" descr="encoder_2.png"/>
           <p:cNvPicPr/>
           <p:nvPr/>
         </p:nvPicPr>
@@ -4852,8 +5103,8 @@
         </p:blipFill>
         <p:spPr>
           <a:xfrm>
-            <a:off x="13182840" y="11442240"/>
-            <a:ext cx="3514320" cy="1228320"/>
+            <a:off x="13422600" y="16827840"/>
+            <a:ext cx="2352240" cy="609120"/>
           </a:xfrm>
           <a:prstGeom prst="rect">
             <a:avLst/>
@@ -4865,35 +5116,12 @@
       </p:pic>
       <p:pic>
         <p:nvPicPr>
-          <p:cNvPr id="91" name="Google Shape;135;p13" descr="encoder_2.png"/>
+          <p:cNvPr id="93" name="Google Shape;136;p13" descr="encoder_2.png"/>
           <p:cNvPicPr/>
           <p:nvPr/>
         </p:nvPicPr>
         <p:blipFill>
           <a:blip r:embed="rId12"/>
-          <a:stretch/>
-        </p:blipFill>
-        <p:spPr>
-          <a:xfrm>
-            <a:off x="13422600" y="16827840"/>
-            <a:ext cx="2352240" cy="609120"/>
-          </a:xfrm>
-          <a:prstGeom prst="rect">
-            <a:avLst/>
-          </a:prstGeom>
-          <a:ln w="0">
-            <a:noFill/>
-          </a:ln>
-        </p:spPr>
-      </p:pic>
-      <p:pic>
-        <p:nvPicPr>
-          <p:cNvPr id="92" name="Google Shape;136;p13" descr="encoder_2.png"/>
-          <p:cNvPicPr/>
-          <p:nvPr/>
-        </p:nvPicPr>
-        <p:blipFill>
-          <a:blip r:embed="rId13"/>
           <a:srcRect l="0" t="0" r="49885" b="0"/>
           <a:stretch/>
         </p:blipFill>
@@ -4912,7 +5140,7 @@
       </p:pic>
       <p:sp>
         <p:nvSpPr>
-          <p:cNvPr id="93" name="Google Shape;137;p13"/>
+          <p:cNvPr id="94" name="Google Shape;137;p13"/>
           <p:cNvSpPr/>
           <p:nvPr/>
         </p:nvSpPr>
@@ -4966,36 +5194,36 @@
       </p:sp>
       <p:pic>
         <p:nvPicPr>
-          <p:cNvPr id="94" name="Google Shape;138;p13" descr="encoder_1.png"/>
+          <p:cNvPr id="95" name="Google Shape;138;p13" descr="encoder_1.png"/>
+          <p:cNvPicPr/>
+          <p:nvPr/>
+        </p:nvPicPr>
+        <p:blipFill>
+          <a:blip r:embed="rId13"/>
+          <a:srcRect l="31333" t="14591" r="61989" b="52710"/>
+          <a:stretch/>
+        </p:blipFill>
+        <p:spPr>
+          <a:xfrm>
+            <a:off x="13255920" y="12698640"/>
+            <a:ext cx="234000" cy="401760"/>
+          </a:xfrm>
+          <a:prstGeom prst="rect">
+            <a:avLst/>
+          </a:prstGeom>
+          <a:ln w="0">
+            <a:noFill/>
+          </a:ln>
+        </p:spPr>
+      </p:pic>
+      <p:pic>
+        <p:nvPicPr>
+          <p:cNvPr id="96" name="Google Shape;139;p13" descr="encoder_1.png"/>
           <p:cNvPicPr/>
           <p:nvPr/>
         </p:nvPicPr>
         <p:blipFill>
           <a:blip r:embed="rId14"/>
-          <a:srcRect l="31333" t="14591" r="61989" b="52710"/>
-          <a:stretch/>
-        </p:blipFill>
-        <p:spPr>
-          <a:xfrm>
-            <a:off x="13255920" y="12698640"/>
-            <a:ext cx="234000" cy="401760"/>
-          </a:xfrm>
-          <a:prstGeom prst="rect">
-            <a:avLst/>
-          </a:prstGeom>
-          <a:ln w="0">
-            <a:noFill/>
-          </a:ln>
-        </p:spPr>
-      </p:pic>
-      <p:pic>
-        <p:nvPicPr>
-          <p:cNvPr id="95" name="Google Shape;139;p13" descr="encoder_1.png"/>
-          <p:cNvPicPr/>
-          <p:nvPr/>
-        </p:nvPicPr>
-        <p:blipFill>
-          <a:blip r:embed="rId15"/>
           <a:srcRect l="46789" t="14503" r="34743" b="52798"/>
           <a:stretch/>
         </p:blipFill>
@@ -5014,7 +5242,7 @@
       </p:pic>
       <p:sp>
         <p:nvSpPr>
-          <p:cNvPr id="96" name="Google Shape;140;p13"/>
+          <p:cNvPr id="97" name="Google Shape;140;p13"/>
           <p:cNvSpPr/>
           <p:nvPr/>
         </p:nvSpPr>
@@ -5078,7 +5306,7 @@
       </p:sp>
       <p:sp>
         <p:nvSpPr>
-          <p:cNvPr id="97" name="Google Shape;141;p13"/>
+          <p:cNvPr id="98" name="Google Shape;141;p13"/>
           <p:cNvSpPr/>
           <p:nvPr/>
         </p:nvSpPr>
@@ -5270,7 +5498,7 @@
       </p:sp>
       <p:sp>
         <p:nvSpPr>
-          <p:cNvPr id="98" name="Google Shape;142;p13"/>
+          <p:cNvPr id="99" name="Google Shape;142;p13"/>
           <p:cNvSpPr/>
           <p:nvPr/>
         </p:nvSpPr>
@@ -5324,12 +5552,12 @@
       </p:sp>
       <p:pic>
         <p:nvPicPr>
-          <p:cNvPr id="99" name="Google Shape;143;p13" descr="code2.png"/>
+          <p:cNvPr id="100" name="Google Shape;143;p13" descr="code2.png"/>
           <p:cNvPicPr/>
           <p:nvPr/>
         </p:nvPicPr>
         <p:blipFill>
-          <a:blip r:embed="rId16"/>
+          <a:blip r:embed="rId15"/>
           <a:stretch/>
         </p:blipFill>
         <p:spPr>
@@ -5347,7 +5575,7 @@
       </p:pic>
       <p:sp>
         <p:nvSpPr>
-          <p:cNvPr id="100" name="Google Shape;144;p13"/>
+          <p:cNvPr id="101" name="Google Shape;144;p13"/>
           <p:cNvSpPr/>
           <p:nvPr/>
         </p:nvSpPr>
@@ -5378,7 +5606,7 @@
       </p:sp>
       <p:sp>
         <p:nvSpPr>
-          <p:cNvPr id="101" name="Google Shape;145;p13"/>
+          <p:cNvPr id="102" name="Google Shape;145;p13"/>
           <p:cNvSpPr/>
           <p:nvPr/>
         </p:nvSpPr>
@@ -5409,40 +5637,17 @@
       </p:sp>
       <p:pic>
         <p:nvPicPr>
-          <p:cNvPr id="102" name="" descr=""/>
-          <p:cNvPicPr/>
-          <p:nvPr/>
-        </p:nvPicPr>
-        <p:blipFill>
-          <a:blip r:embed="rId17"/>
-          <a:stretch/>
-        </p:blipFill>
-        <p:spPr>
-          <a:xfrm>
-            <a:off x="37682640" y="1738800"/>
-            <a:ext cx="1258200" cy="1179000"/>
-          </a:xfrm>
-          <a:prstGeom prst="rect">
-            <a:avLst/>
-          </a:prstGeom>
-          <a:ln w="0">
-            <a:noFill/>
-          </a:ln>
-        </p:spPr>
-      </p:pic>
-      <p:pic>
-        <p:nvPicPr>
           <p:cNvPr id="103" name="" descr=""/>
           <p:cNvPicPr/>
           <p:nvPr/>
         </p:nvPicPr>
         <p:blipFill>
-          <a:blip r:embed="rId18"/>
+          <a:blip r:embed="rId16"/>
           <a:stretch/>
         </p:blipFill>
         <p:spPr>
           <a:xfrm>
-            <a:off x="34975800" y="914400"/>
+            <a:off x="914400" y="914400"/>
             <a:ext cx="6194880" cy="5805000"/>
           </a:xfrm>
           <a:prstGeom prst="rect">

</xml_diff>